<commit_message>
BS done, made 4 new tables
</commit_message>
<xml_diff>
--- a/Modul_1/Business project/Бизнес-цикл.pptx
+++ b/Modul_1/Business project/Бизнес-цикл.pptx
@@ -243,7 +243,7 @@
           <a:p>
             <a:fld id="{C4A58018-C3F7-42FF-A7A0-9AD3EF231398}" type="datetimeFigureOut">
               <a:rPr lang="ru-RU" smtClean="0"/>
-              <a:t>25.07.2022</a:t>
+              <a:t>29.07.2022</a:t>
             </a:fld>
             <a:endParaRPr lang="ru-RU"/>
           </a:p>
@@ -413,7 +413,7 @@
           <a:p>
             <a:fld id="{C4A58018-C3F7-42FF-A7A0-9AD3EF231398}" type="datetimeFigureOut">
               <a:rPr lang="ru-RU" smtClean="0"/>
-              <a:t>25.07.2022</a:t>
+              <a:t>29.07.2022</a:t>
             </a:fld>
             <a:endParaRPr lang="ru-RU"/>
           </a:p>
@@ -593,7 +593,7 @@
           <a:p>
             <a:fld id="{C4A58018-C3F7-42FF-A7A0-9AD3EF231398}" type="datetimeFigureOut">
               <a:rPr lang="ru-RU" smtClean="0"/>
-              <a:t>25.07.2022</a:t>
+              <a:t>29.07.2022</a:t>
             </a:fld>
             <a:endParaRPr lang="ru-RU"/>
           </a:p>
@@ -763,7 +763,7 @@
           <a:p>
             <a:fld id="{C4A58018-C3F7-42FF-A7A0-9AD3EF231398}" type="datetimeFigureOut">
               <a:rPr lang="ru-RU" smtClean="0"/>
-              <a:t>25.07.2022</a:t>
+              <a:t>29.07.2022</a:t>
             </a:fld>
             <a:endParaRPr lang="ru-RU"/>
           </a:p>
@@ -1009,7 +1009,7 @@
           <a:p>
             <a:fld id="{C4A58018-C3F7-42FF-A7A0-9AD3EF231398}" type="datetimeFigureOut">
               <a:rPr lang="ru-RU" smtClean="0"/>
-              <a:t>25.07.2022</a:t>
+              <a:t>29.07.2022</a:t>
             </a:fld>
             <a:endParaRPr lang="ru-RU"/>
           </a:p>
@@ -1241,7 +1241,7 @@
           <a:p>
             <a:fld id="{C4A58018-C3F7-42FF-A7A0-9AD3EF231398}" type="datetimeFigureOut">
               <a:rPr lang="ru-RU" smtClean="0"/>
-              <a:t>25.07.2022</a:t>
+              <a:t>29.07.2022</a:t>
             </a:fld>
             <a:endParaRPr lang="ru-RU"/>
           </a:p>
@@ -1608,7 +1608,7 @@
           <a:p>
             <a:fld id="{C4A58018-C3F7-42FF-A7A0-9AD3EF231398}" type="datetimeFigureOut">
               <a:rPr lang="ru-RU" smtClean="0"/>
-              <a:t>25.07.2022</a:t>
+              <a:t>29.07.2022</a:t>
             </a:fld>
             <a:endParaRPr lang="ru-RU"/>
           </a:p>
@@ -1726,7 +1726,7 @@
           <a:p>
             <a:fld id="{C4A58018-C3F7-42FF-A7A0-9AD3EF231398}" type="datetimeFigureOut">
               <a:rPr lang="ru-RU" smtClean="0"/>
-              <a:t>25.07.2022</a:t>
+              <a:t>29.07.2022</a:t>
             </a:fld>
             <a:endParaRPr lang="ru-RU"/>
           </a:p>
@@ -1821,7 +1821,7 @@
           <a:p>
             <a:fld id="{C4A58018-C3F7-42FF-A7A0-9AD3EF231398}" type="datetimeFigureOut">
               <a:rPr lang="ru-RU" smtClean="0"/>
-              <a:t>25.07.2022</a:t>
+              <a:t>29.07.2022</a:t>
             </a:fld>
             <a:endParaRPr lang="ru-RU"/>
           </a:p>
@@ -2098,7 +2098,7 @@
           <a:p>
             <a:fld id="{C4A58018-C3F7-42FF-A7A0-9AD3EF231398}" type="datetimeFigureOut">
               <a:rPr lang="ru-RU" smtClean="0"/>
-              <a:t>25.07.2022</a:t>
+              <a:t>29.07.2022</a:t>
             </a:fld>
             <a:endParaRPr lang="ru-RU"/>
           </a:p>
@@ -2351,7 +2351,7 @@
           <a:p>
             <a:fld id="{C4A58018-C3F7-42FF-A7A0-9AD3EF231398}" type="datetimeFigureOut">
               <a:rPr lang="ru-RU" smtClean="0"/>
-              <a:t>25.07.2022</a:t>
+              <a:t>29.07.2022</a:t>
             </a:fld>
             <a:endParaRPr lang="ru-RU"/>
           </a:p>
@@ -2564,7 +2564,7 @@
           <a:p>
             <a:fld id="{C4A58018-C3F7-42FF-A7A0-9AD3EF231398}" type="datetimeFigureOut">
               <a:rPr lang="ru-RU" smtClean="0"/>
-              <a:t>25.07.2022</a:t>
+              <a:t>29.07.2022</a:t>
             </a:fld>
             <a:endParaRPr lang="ru-RU"/>
           </a:p>
@@ -2977,8 +2977,8 @@
         </p:nvSpPr>
         <p:spPr>
           <a:xfrm>
-            <a:off x="679269" y="888274"/>
-            <a:ext cx="1314994" cy="609600"/>
+            <a:off x="622663" y="400594"/>
+            <a:ext cx="1528359" cy="1309590"/>
           </a:xfrm>
           <a:prstGeom prst="rect">
             <a:avLst/>
@@ -3016,13 +3016,14 @@
           <p:cNvPr id="7" name="Прямая со стрелкой 6"/>
           <p:cNvCxnSpPr>
             <a:stCxn id="5" idx="3"/>
+            <a:endCxn id="8" idx="1"/>
           </p:cNvCxnSpPr>
           <p:nvPr/>
         </p:nvCxnSpPr>
         <p:spPr>
           <a:xfrm>
-            <a:off x="1994263" y="1193074"/>
-            <a:ext cx="827314" cy="0"/>
+            <a:off x="2151022" y="1055389"/>
+            <a:ext cx="613951" cy="0"/>
           </a:xfrm>
           <a:prstGeom prst="straightConnector1">
             <a:avLst/>
@@ -3054,8 +3055,8 @@
         </p:nvSpPr>
         <p:spPr>
           <a:xfrm>
-            <a:off x="2821577" y="888274"/>
-            <a:ext cx="1314994" cy="609600"/>
+            <a:off x="2764973" y="400594"/>
+            <a:ext cx="1584960" cy="1309590"/>
           </a:xfrm>
           <a:prstGeom prst="rect">
             <a:avLst/>
@@ -3082,7 +3083,14 @@
             <a:pPr algn="ctr"/>
             <a:r>
               <a:rPr lang="ru-RU" dirty="0" smtClean="0"/>
-              <a:t>Реклама</a:t>
+              <a:t>Реклама или</a:t>
+            </a:r>
+          </a:p>
+          <a:p>
+            <a:pPr algn="ctr"/>
+            <a:r>
+              <a:rPr lang="ru-RU" dirty="0" smtClean="0"/>
+              <a:t>поисковая выдача</a:t>
             </a:r>
             <a:endParaRPr lang="ru-RU" dirty="0"/>
           </a:p>
@@ -3093,13 +3101,14 @@
           <p:cNvPr id="9" name="Прямая со стрелкой 8"/>
           <p:cNvCxnSpPr>
             <a:stCxn id="8" idx="3"/>
+            <a:endCxn id="10" idx="1"/>
           </p:cNvCxnSpPr>
           <p:nvPr/>
         </p:nvCxnSpPr>
         <p:spPr>
           <a:xfrm>
-            <a:off x="4136571" y="1193074"/>
-            <a:ext cx="827314" cy="0"/>
+            <a:off x="4349933" y="1055389"/>
+            <a:ext cx="613951" cy="0"/>
           </a:xfrm>
           <a:prstGeom prst="straightConnector1">
             <a:avLst/>
@@ -3131,8 +3140,8 @@
         </p:nvSpPr>
         <p:spPr>
           <a:xfrm>
-            <a:off x="4963885" y="644434"/>
-            <a:ext cx="1314994" cy="853440"/>
+            <a:off x="4963884" y="400594"/>
+            <a:ext cx="1528357" cy="1309590"/>
           </a:xfrm>
           <a:prstGeom prst="rect">
             <a:avLst/>
@@ -3168,13 +3177,16 @@
       <p:cxnSp>
         <p:nvCxnSpPr>
           <p:cNvPr id="11" name="Прямая со стрелкой 10"/>
-          <p:cNvCxnSpPr/>
+          <p:cNvCxnSpPr>
+            <a:stCxn id="10" idx="3"/>
+            <a:endCxn id="13" idx="1"/>
+          </p:cNvCxnSpPr>
           <p:nvPr/>
         </p:nvCxnSpPr>
         <p:spPr>
           <a:xfrm>
-            <a:off x="6278879" y="1193074"/>
-            <a:ext cx="827314" cy="0"/>
+            <a:off x="6492241" y="1055389"/>
+            <a:ext cx="613951" cy="0"/>
           </a:xfrm>
           <a:prstGeom prst="straightConnector1">
             <a:avLst/>
@@ -3200,55 +3212,6 @@
       </p:cxnSp>
       <p:sp>
         <p:nvSpPr>
-          <p:cNvPr id="12" name="Выноска-облако 11"/>
-          <p:cNvSpPr/>
-          <p:nvPr/>
-        </p:nvSpPr>
-        <p:spPr>
-          <a:xfrm>
-            <a:off x="2773679" y="888274"/>
-            <a:ext cx="1410789" cy="609600"/>
-          </a:xfrm>
-          <a:prstGeom prst="cloudCallout">
-            <a:avLst>
-              <a:gd name="adj1" fmla="val -38117"/>
-              <a:gd name="adj2" fmla="val 76786"/>
-            </a:avLst>
-          </a:prstGeom>
-          <a:solidFill>
-            <a:schemeClr val="accent2">
-              <a:alpha val="50000"/>
-            </a:schemeClr>
-          </a:solidFill>
-          <a:ln>
-            <a:noFill/>
-          </a:ln>
-        </p:spPr>
-        <p:style>
-          <a:lnRef idx="0">
-            <a:scrgbClr r="0" g="0" b="0"/>
-          </a:lnRef>
-          <a:fillRef idx="0">
-            <a:scrgbClr r="0" g="0" b="0"/>
-          </a:fillRef>
-          <a:effectRef idx="0">
-            <a:scrgbClr r="0" g="0" b="0"/>
-          </a:effectRef>
-          <a:fontRef idx="minor">
-            <a:schemeClr val="lt1"/>
-          </a:fontRef>
-        </p:style>
-        <p:txBody>
-          <a:bodyPr rtlCol="0" anchor="ctr"/>
-          <a:lstStyle/>
-          <a:p>
-            <a:pPr algn="ctr"/>
-            <a:endParaRPr lang="ru-RU"/>
-          </a:p>
-        </p:txBody>
-      </p:sp>
-      <p:sp>
-        <p:nvSpPr>
           <p:cNvPr id="13" name="Прямоугольник 12"/>
           <p:cNvSpPr/>
           <p:nvPr/>
@@ -3256,7 +3219,7 @@
         <p:spPr>
           <a:xfrm>
             <a:off x="7106192" y="400594"/>
-            <a:ext cx="4781007" cy="1097280"/>
+            <a:ext cx="4781007" cy="1309590"/>
           </a:xfrm>
           <a:prstGeom prst="rect">
             <a:avLst/>
@@ -3299,8 +3262,8 @@
         </p:nvCxnSpPr>
         <p:spPr>
           <a:xfrm>
-            <a:off x="11887199" y="949234"/>
-            <a:ext cx="0" cy="1750423"/>
+            <a:off x="11887199" y="1055389"/>
+            <a:ext cx="0" cy="1814988"/>
           </a:xfrm>
           <a:prstGeom prst="straightConnector1">
             <a:avLst/>
@@ -3332,8 +3295,8 @@
         </p:nvSpPr>
         <p:spPr>
           <a:xfrm>
-            <a:off x="8752114" y="2699657"/>
-            <a:ext cx="3135085" cy="1158240"/>
+            <a:off x="8752114" y="2870377"/>
+            <a:ext cx="3135085" cy="1302831"/>
           </a:xfrm>
           <a:prstGeom prst="rect">
             <a:avLst/>
@@ -3369,13 +3332,16 @@
       <p:cxnSp>
         <p:nvCxnSpPr>
           <p:cNvPr id="23" name="Прямая со стрелкой 22"/>
-          <p:cNvCxnSpPr/>
+          <p:cNvCxnSpPr>
+            <a:stCxn id="22" idx="1"/>
+            <a:endCxn id="40" idx="3"/>
+          </p:cNvCxnSpPr>
           <p:nvPr/>
         </p:nvCxnSpPr>
         <p:spPr>
-          <a:xfrm flipH="1" flipV="1">
-            <a:off x="7942218" y="3004457"/>
-            <a:ext cx="809896" cy="8709"/>
+          <a:xfrm flipH="1">
+            <a:off x="8159930" y="3521793"/>
+            <a:ext cx="592184" cy="0"/>
           </a:xfrm>
           <a:prstGeom prst="straightConnector1">
             <a:avLst/>
@@ -3407,8 +3373,8 @@
         </p:nvSpPr>
         <p:spPr>
           <a:xfrm>
-            <a:off x="6061166" y="2699657"/>
-            <a:ext cx="1881051" cy="609600"/>
+            <a:off x="6278879" y="2870377"/>
+            <a:ext cx="1881051" cy="1302831"/>
           </a:xfrm>
           <a:prstGeom prst="rect">
             <a:avLst/>
@@ -3446,13 +3412,14 @@
           <p:cNvPr id="41" name="Прямая со стрелкой 40"/>
           <p:cNvCxnSpPr>
             <a:stCxn id="40" idx="1"/>
+            <a:endCxn id="45" idx="3"/>
           </p:cNvCxnSpPr>
           <p:nvPr/>
         </p:nvCxnSpPr>
         <p:spPr>
           <a:xfrm flipH="1">
-            <a:off x="5669282" y="3004457"/>
-            <a:ext cx="391884" cy="0"/>
+            <a:off x="5715001" y="3521793"/>
+            <a:ext cx="563878" cy="0"/>
           </a:xfrm>
           <a:prstGeom prst="straightConnector1">
             <a:avLst/>
@@ -3484,8 +3451,8 @@
         </p:nvSpPr>
         <p:spPr>
           <a:xfrm>
-            <a:off x="3283131" y="2699657"/>
-            <a:ext cx="2386151" cy="940526"/>
+            <a:off x="3328850" y="2870377"/>
+            <a:ext cx="2386151" cy="1302831"/>
           </a:xfrm>
           <a:prstGeom prst="rect">
             <a:avLst/>
@@ -3512,7 +3479,11 @@
             <a:pPr algn="ctr"/>
             <a:r>
               <a:rPr lang="ru-RU" dirty="0" smtClean="0"/>
-              <a:t>Данные о заказе передаются водителю и он едет покупать</a:t>
+              <a:t>Данные о заказе передаются </a:t>
+            </a:r>
+            <a:r>
+              <a:rPr lang="ru-RU" dirty="0" smtClean="0"/>
+              <a:t>исполнителю для покупки</a:t>
             </a:r>
             <a:endParaRPr lang="ru-RU" dirty="0"/>
           </a:p>
@@ -3521,13 +3492,16 @@
       <p:cxnSp>
         <p:nvCxnSpPr>
           <p:cNvPr id="46" name="Прямая со стрелкой 45"/>
-          <p:cNvCxnSpPr/>
+          <p:cNvCxnSpPr>
+            <a:stCxn id="45" idx="1"/>
+            <a:endCxn id="72" idx="3"/>
+          </p:cNvCxnSpPr>
           <p:nvPr/>
         </p:nvCxnSpPr>
         <p:spPr>
           <a:xfrm flipH="1">
-            <a:off x="2773681" y="3004457"/>
-            <a:ext cx="500742" cy="1"/>
+            <a:off x="2764973" y="3521793"/>
+            <a:ext cx="563877" cy="0"/>
           </a:xfrm>
           <a:prstGeom prst="straightConnector1">
             <a:avLst/>
@@ -3559,8 +3533,8 @@
         </p:nvSpPr>
         <p:spPr>
           <a:xfrm>
-            <a:off x="574766" y="4045132"/>
-            <a:ext cx="1920241" cy="931817"/>
+            <a:off x="574766" y="5328745"/>
+            <a:ext cx="2246811" cy="1302831"/>
           </a:xfrm>
           <a:prstGeom prst="rect">
             <a:avLst/>
@@ -3587,7 +3561,7 @@
             <a:pPr algn="ctr"/>
             <a:r>
               <a:rPr lang="ru-RU" dirty="0" smtClean="0"/>
-              <a:t>При покупке меняет статус на куплено</a:t>
+              <a:t>Исполнитель проходит границу, при необходимости платит пошлину </a:t>
             </a:r>
             <a:endParaRPr lang="ru-RU" dirty="0"/>
           </a:p>
@@ -3597,14 +3571,15 @@
         <p:nvCxnSpPr>
           <p:cNvPr id="52" name="Прямая со стрелкой 51"/>
           <p:cNvCxnSpPr>
-            <a:stCxn id="51" idx="1"/>
+            <a:stCxn id="51" idx="3"/>
+            <a:endCxn id="62" idx="1"/>
           </p:cNvCxnSpPr>
           <p:nvPr/>
         </p:nvCxnSpPr>
         <p:spPr>
-          <a:xfrm>
-            <a:off x="574766" y="4511041"/>
-            <a:ext cx="0" cy="1197429"/>
+          <a:xfrm flipV="1">
+            <a:off x="2821577" y="5980160"/>
+            <a:ext cx="688429" cy="1"/>
           </a:xfrm>
           <a:prstGeom prst="straightConnector1">
             <a:avLst/>
@@ -3636,8 +3611,8 @@
         </p:nvSpPr>
         <p:spPr>
           <a:xfrm>
-            <a:off x="574766" y="5708470"/>
-            <a:ext cx="1314994" cy="609600"/>
+            <a:off x="3510006" y="5328744"/>
+            <a:ext cx="1592763" cy="1302831"/>
           </a:xfrm>
           <a:prstGeom prst="rect">
             <a:avLst/>
@@ -3663,8 +3638,16 @@
           <a:p>
             <a:pPr algn="ctr"/>
             <a:r>
+              <a:rPr lang="ru-RU" dirty="0"/>
+              <a:t>Исполнитель </a:t>
+            </a:r>
+            <a:r>
               <a:rPr lang="ru-RU" dirty="0" smtClean="0"/>
-              <a:t>Везет в РБ</a:t>
+              <a:t>везет заказ </a:t>
+            </a:r>
+            <a:r>
+              <a:rPr lang="ru-RU" dirty="0" smtClean="0"/>
+              <a:t>к месту назначения</a:t>
             </a:r>
             <a:endParaRPr lang="ru-RU" dirty="0"/>
           </a:p>
@@ -3675,13 +3658,14 @@
           <p:cNvPr id="63" name="Прямая со стрелкой 62"/>
           <p:cNvCxnSpPr>
             <a:stCxn id="62" idx="3"/>
+            <a:endCxn id="64" idx="1"/>
           </p:cNvCxnSpPr>
           <p:nvPr/>
         </p:nvCxnSpPr>
         <p:spPr>
           <a:xfrm>
-            <a:off x="1889760" y="6013270"/>
-            <a:ext cx="827314" cy="0"/>
+            <a:off x="5102769" y="5980160"/>
+            <a:ext cx="688430" cy="2"/>
           </a:xfrm>
           <a:prstGeom prst="straightConnector1">
             <a:avLst/>
@@ -3713,8 +3697,8 @@
         </p:nvSpPr>
         <p:spPr>
           <a:xfrm>
-            <a:off x="2717074" y="5699760"/>
-            <a:ext cx="1793966" cy="931817"/>
+            <a:off x="5791199" y="5328746"/>
+            <a:ext cx="1793966" cy="1302832"/>
           </a:xfrm>
           <a:prstGeom prst="rect">
             <a:avLst/>
@@ -3741,7 +3725,11 @@
             <a:pPr algn="ctr"/>
             <a:r>
               <a:rPr lang="ru-RU" dirty="0" smtClean="0"/>
-              <a:t>Компания передает клиенту</a:t>
+              <a:t>Исполнитель передает заказ </a:t>
+            </a:r>
+            <a:r>
+              <a:rPr lang="ru-RU" dirty="0" smtClean="0"/>
+              <a:t>клиенту</a:t>
             </a:r>
             <a:endParaRPr lang="ru-RU" dirty="0"/>
           </a:p>
@@ -3755,7 +3743,7 @@
         </p:nvCxnSpPr>
         <p:spPr>
           <a:xfrm>
-            <a:off x="4511040" y="6013270"/>
+            <a:off x="7585165" y="6013270"/>
             <a:ext cx="879568" cy="1"/>
           </a:xfrm>
           <a:prstGeom prst="straightConnector1">
@@ -3788,8 +3776,8 @@
         </p:nvSpPr>
         <p:spPr>
           <a:xfrm>
-            <a:off x="574766" y="2671355"/>
-            <a:ext cx="2190207" cy="931817"/>
+            <a:off x="574766" y="2870377"/>
+            <a:ext cx="2190207" cy="1302831"/>
           </a:xfrm>
           <a:prstGeom prst="rect">
             <a:avLst/>
@@ -3816,7 +3804,19 @@
             <a:pPr algn="ctr"/>
             <a:r>
               <a:rPr lang="ru-RU" dirty="0" smtClean="0"/>
-              <a:t>Водитель возвращает НДС с прошлой поездки</a:t>
+              <a:t>Исполнитель</a:t>
+            </a:r>
+            <a:r>
+              <a:rPr lang="ru-RU" dirty="0" smtClean="0"/>
+              <a:t> </a:t>
+            </a:r>
+            <a:r>
+              <a:rPr lang="ru-RU" dirty="0" smtClean="0"/>
+              <a:t>возвращает НДС с прошлой </a:t>
+            </a:r>
+            <a:r>
+              <a:rPr lang="ru-RU" dirty="0" smtClean="0"/>
+              <a:t>поездки и покупает товар</a:t>
             </a:r>
             <a:endParaRPr lang="ru-RU" dirty="0"/>
           </a:p>
@@ -3832,8 +3832,8 @@
         </p:nvCxnSpPr>
         <p:spPr>
           <a:xfrm>
-            <a:off x="574766" y="3137264"/>
-            <a:ext cx="0" cy="907868"/>
+            <a:off x="574766" y="3521793"/>
+            <a:ext cx="0" cy="1806951"/>
           </a:xfrm>
           <a:prstGeom prst="straightConnector1">
             <a:avLst/>
@@ -3865,7 +3865,7 @@
         </p:nvSpPr>
         <p:spPr>
           <a:xfrm>
-            <a:off x="5390608" y="5505996"/>
+            <a:off x="8464733" y="5505996"/>
             <a:ext cx="2168434" cy="1014548"/>
           </a:xfrm>
           <a:prstGeom prst="ellipse">

</xml_diff>

<commit_message>
Add business solution in english
</commit_message>
<xml_diff>
--- a/Modul_1/Business project/Бизнес-цикл.pptx
+++ b/Modul_1/Business project/Бизнес-цикл.pptx
@@ -6,6 +6,7 @@
   </p:sldMasterIdLst>
   <p:sldIdLst>
     <p:sldId id="256" r:id="rId2"/>
+    <p:sldId id="257" r:id="rId3"/>
   </p:sldIdLst>
   <p:sldSz cx="12192000" cy="6858000"/>
   <p:notesSz cx="6858000" cy="9144000"/>
@@ -243,7 +244,7 @@
           <a:p>
             <a:fld id="{C4A58018-C3F7-42FF-A7A0-9AD3EF231398}" type="datetimeFigureOut">
               <a:rPr lang="ru-RU" smtClean="0"/>
-              <a:t>29.07.2022</a:t>
+              <a:t>30.07.2022</a:t>
             </a:fld>
             <a:endParaRPr lang="ru-RU"/>
           </a:p>
@@ -413,7 +414,7 @@
           <a:p>
             <a:fld id="{C4A58018-C3F7-42FF-A7A0-9AD3EF231398}" type="datetimeFigureOut">
               <a:rPr lang="ru-RU" smtClean="0"/>
-              <a:t>29.07.2022</a:t>
+              <a:t>30.07.2022</a:t>
             </a:fld>
             <a:endParaRPr lang="ru-RU"/>
           </a:p>
@@ -593,7 +594,7 @@
           <a:p>
             <a:fld id="{C4A58018-C3F7-42FF-A7A0-9AD3EF231398}" type="datetimeFigureOut">
               <a:rPr lang="ru-RU" smtClean="0"/>
-              <a:t>29.07.2022</a:t>
+              <a:t>30.07.2022</a:t>
             </a:fld>
             <a:endParaRPr lang="ru-RU"/>
           </a:p>
@@ -763,7 +764,7 @@
           <a:p>
             <a:fld id="{C4A58018-C3F7-42FF-A7A0-9AD3EF231398}" type="datetimeFigureOut">
               <a:rPr lang="ru-RU" smtClean="0"/>
-              <a:t>29.07.2022</a:t>
+              <a:t>30.07.2022</a:t>
             </a:fld>
             <a:endParaRPr lang="ru-RU"/>
           </a:p>
@@ -1009,7 +1010,7 @@
           <a:p>
             <a:fld id="{C4A58018-C3F7-42FF-A7A0-9AD3EF231398}" type="datetimeFigureOut">
               <a:rPr lang="ru-RU" smtClean="0"/>
-              <a:t>29.07.2022</a:t>
+              <a:t>30.07.2022</a:t>
             </a:fld>
             <a:endParaRPr lang="ru-RU"/>
           </a:p>
@@ -1241,7 +1242,7 @@
           <a:p>
             <a:fld id="{C4A58018-C3F7-42FF-A7A0-9AD3EF231398}" type="datetimeFigureOut">
               <a:rPr lang="ru-RU" smtClean="0"/>
-              <a:t>29.07.2022</a:t>
+              <a:t>30.07.2022</a:t>
             </a:fld>
             <a:endParaRPr lang="ru-RU"/>
           </a:p>
@@ -1608,7 +1609,7 @@
           <a:p>
             <a:fld id="{C4A58018-C3F7-42FF-A7A0-9AD3EF231398}" type="datetimeFigureOut">
               <a:rPr lang="ru-RU" smtClean="0"/>
-              <a:t>29.07.2022</a:t>
+              <a:t>30.07.2022</a:t>
             </a:fld>
             <a:endParaRPr lang="ru-RU"/>
           </a:p>
@@ -1726,7 +1727,7 @@
           <a:p>
             <a:fld id="{C4A58018-C3F7-42FF-A7A0-9AD3EF231398}" type="datetimeFigureOut">
               <a:rPr lang="ru-RU" smtClean="0"/>
-              <a:t>29.07.2022</a:t>
+              <a:t>30.07.2022</a:t>
             </a:fld>
             <a:endParaRPr lang="ru-RU"/>
           </a:p>
@@ -1821,7 +1822,7 @@
           <a:p>
             <a:fld id="{C4A58018-C3F7-42FF-A7A0-9AD3EF231398}" type="datetimeFigureOut">
               <a:rPr lang="ru-RU" smtClean="0"/>
-              <a:t>29.07.2022</a:t>
+              <a:t>30.07.2022</a:t>
             </a:fld>
             <a:endParaRPr lang="ru-RU"/>
           </a:p>
@@ -2098,7 +2099,7 @@
           <a:p>
             <a:fld id="{C4A58018-C3F7-42FF-A7A0-9AD3EF231398}" type="datetimeFigureOut">
               <a:rPr lang="ru-RU" smtClean="0"/>
-              <a:t>29.07.2022</a:t>
+              <a:t>30.07.2022</a:t>
             </a:fld>
             <a:endParaRPr lang="ru-RU"/>
           </a:p>
@@ -2351,7 +2352,7 @@
           <a:p>
             <a:fld id="{C4A58018-C3F7-42FF-A7A0-9AD3EF231398}" type="datetimeFigureOut">
               <a:rPr lang="ru-RU" smtClean="0"/>
-              <a:t>29.07.2022</a:t>
+              <a:t>30.07.2022</a:t>
             </a:fld>
             <a:endParaRPr lang="ru-RU"/>
           </a:p>
@@ -2564,7 +2565,7 @@
           <a:p>
             <a:fld id="{C4A58018-C3F7-42FF-A7A0-9AD3EF231398}" type="datetimeFigureOut">
               <a:rPr lang="ru-RU" smtClean="0"/>
-              <a:t>29.07.2022</a:t>
+              <a:t>30.07.2022</a:t>
             </a:fld>
             <a:endParaRPr lang="ru-RU"/>
           </a:p>
@@ -3479,11 +3480,7 @@
             <a:pPr algn="ctr"/>
             <a:r>
               <a:rPr lang="ru-RU" dirty="0" smtClean="0"/>
-              <a:t>Данные о заказе передаются </a:t>
-            </a:r>
-            <a:r>
-              <a:rPr lang="ru-RU" dirty="0" smtClean="0"/>
-              <a:t>исполнителю для покупки</a:t>
+              <a:t>Данные о заказе передаются исполнителю для покупки</a:t>
             </a:r>
             <a:endParaRPr lang="ru-RU" dirty="0"/>
           </a:p>
@@ -3643,11 +3640,7 @@
             </a:r>
             <a:r>
               <a:rPr lang="ru-RU" dirty="0" smtClean="0"/>
-              <a:t>везет заказ </a:t>
-            </a:r>
-            <a:r>
-              <a:rPr lang="ru-RU" dirty="0" smtClean="0"/>
-              <a:t>к месту назначения</a:t>
+              <a:t>везет заказ к месту назначения</a:t>
             </a:r>
             <a:endParaRPr lang="ru-RU" dirty="0"/>
           </a:p>
@@ -3725,11 +3718,7 @@
             <a:pPr algn="ctr"/>
             <a:r>
               <a:rPr lang="ru-RU" dirty="0" smtClean="0"/>
-              <a:t>Исполнитель передает заказ </a:t>
-            </a:r>
-            <a:r>
-              <a:rPr lang="ru-RU" dirty="0" smtClean="0"/>
-              <a:t>клиенту</a:t>
+              <a:t>Исполнитель передает заказ клиенту</a:t>
             </a:r>
             <a:endParaRPr lang="ru-RU" dirty="0"/>
           </a:p>
@@ -3804,19 +3793,7 @@
             <a:pPr algn="ctr"/>
             <a:r>
               <a:rPr lang="ru-RU" dirty="0" smtClean="0"/>
-              <a:t>Исполнитель</a:t>
-            </a:r>
-            <a:r>
-              <a:rPr lang="ru-RU" dirty="0" smtClean="0"/>
-              <a:t> </a:t>
-            </a:r>
-            <a:r>
-              <a:rPr lang="ru-RU" dirty="0" smtClean="0"/>
-              <a:t>возвращает НДС с прошлой </a:t>
-            </a:r>
-            <a:r>
-              <a:rPr lang="ru-RU" dirty="0" smtClean="0"/>
-              <a:t>поездки и покупает товар</a:t>
+              <a:t>Исполнитель возвращает НДС с прошлой поездки и покупает товар</a:t>
             </a:r>
             <a:endParaRPr lang="ru-RU" dirty="0"/>
           </a:p>
@@ -3911,6 +3888,962 @@
   <p:clrMapOvr>
     <a:masterClrMapping/>
   </p:clrMapOvr>
+  <p:timing>
+    <p:tnLst>
+      <p:par>
+        <p:cTn id="1" dur="indefinite" restart="never" nodeType="tmRoot"/>
+      </p:par>
+    </p:tnLst>
+  </p:timing>
+</p:sld>
+</file>
+
+<file path=ppt/slides/slide2.xml><?xml version="1.0" encoding="utf-8"?>
+<p:sld xmlns:a="http://schemas.openxmlformats.org/drawingml/2006/main" xmlns:r="http://schemas.openxmlformats.org/officeDocument/2006/relationships" xmlns:p="http://schemas.openxmlformats.org/presentationml/2006/main">
+  <p:cSld>
+    <p:spTree>
+      <p:nvGrpSpPr>
+        <p:cNvPr id="1" name=""/>
+        <p:cNvGrpSpPr/>
+        <p:nvPr/>
+      </p:nvGrpSpPr>
+      <p:grpSpPr>
+        <a:xfrm>
+          <a:off x="0" y="0"/>
+          <a:ext cx="0" cy="0"/>
+          <a:chOff x="0" y="0"/>
+          <a:chExt cx="0" cy="0"/>
+        </a:xfrm>
+      </p:grpSpPr>
+      <p:sp>
+        <p:nvSpPr>
+          <p:cNvPr id="5" name="Прямоугольник 4"/>
+          <p:cNvSpPr/>
+          <p:nvPr/>
+        </p:nvSpPr>
+        <p:spPr>
+          <a:xfrm>
+            <a:off x="622663" y="400594"/>
+            <a:ext cx="1528359" cy="1309590"/>
+          </a:xfrm>
+          <a:prstGeom prst="rect">
+            <a:avLst/>
+          </a:prstGeom>
+        </p:spPr>
+        <p:style>
+          <a:lnRef idx="2">
+            <a:schemeClr val="dk1"/>
+          </a:lnRef>
+          <a:fillRef idx="1">
+            <a:schemeClr val="lt1"/>
+          </a:fillRef>
+          <a:effectRef idx="0">
+            <a:schemeClr val="dk1"/>
+          </a:effectRef>
+          <a:fontRef idx="minor">
+            <a:schemeClr val="dk1"/>
+          </a:fontRef>
+        </p:style>
+        <p:txBody>
+          <a:bodyPr rtlCol="0" anchor="ctr"/>
+          <a:lstStyle/>
+          <a:p>
+            <a:pPr algn="ctr"/>
+            <a:r>
+              <a:rPr lang="en-US" dirty="0" smtClean="0"/>
+              <a:t>Customer</a:t>
+            </a:r>
+            <a:endParaRPr lang="ru-RU" dirty="0"/>
+          </a:p>
+        </p:txBody>
+      </p:sp>
+      <p:cxnSp>
+        <p:nvCxnSpPr>
+          <p:cNvPr id="7" name="Прямая со стрелкой 6"/>
+          <p:cNvCxnSpPr>
+            <a:stCxn id="5" idx="3"/>
+            <a:endCxn id="8" idx="1"/>
+          </p:cNvCxnSpPr>
+          <p:nvPr/>
+        </p:nvCxnSpPr>
+        <p:spPr>
+          <a:xfrm>
+            <a:off x="2151022" y="1055389"/>
+            <a:ext cx="613951" cy="0"/>
+          </a:xfrm>
+          <a:prstGeom prst="straightConnector1">
+            <a:avLst/>
+          </a:prstGeom>
+          <a:ln>
+            <a:tailEnd type="triangle"/>
+          </a:ln>
+        </p:spPr>
+        <p:style>
+          <a:lnRef idx="1">
+            <a:schemeClr val="dk1"/>
+          </a:lnRef>
+          <a:fillRef idx="0">
+            <a:schemeClr val="dk1"/>
+          </a:fillRef>
+          <a:effectRef idx="0">
+            <a:schemeClr val="dk1"/>
+          </a:effectRef>
+          <a:fontRef idx="minor">
+            <a:schemeClr val="tx1"/>
+          </a:fontRef>
+        </p:style>
+      </p:cxnSp>
+      <p:sp>
+        <p:nvSpPr>
+          <p:cNvPr id="8" name="Прямоугольник 7"/>
+          <p:cNvSpPr/>
+          <p:nvPr/>
+        </p:nvSpPr>
+        <p:spPr>
+          <a:xfrm>
+            <a:off x="2764973" y="400594"/>
+            <a:ext cx="1584960" cy="1309590"/>
+          </a:xfrm>
+          <a:prstGeom prst="rect">
+            <a:avLst/>
+          </a:prstGeom>
+        </p:spPr>
+        <p:style>
+          <a:lnRef idx="2">
+            <a:schemeClr val="dk1"/>
+          </a:lnRef>
+          <a:fillRef idx="1">
+            <a:schemeClr val="lt1"/>
+          </a:fillRef>
+          <a:effectRef idx="0">
+            <a:schemeClr val="dk1"/>
+          </a:effectRef>
+          <a:fontRef idx="minor">
+            <a:schemeClr val="dk1"/>
+          </a:fontRef>
+        </p:style>
+        <p:txBody>
+          <a:bodyPr rtlCol="0" anchor="ctr"/>
+          <a:lstStyle/>
+          <a:p>
+            <a:pPr algn="ctr"/>
+            <a:r>
+              <a:rPr lang="en-US" dirty="0"/>
+              <a:t>Advertising or</a:t>
+            </a:r>
+          </a:p>
+          <a:p>
+            <a:pPr algn="ctr"/>
+            <a:r>
+              <a:rPr lang="en-US" dirty="0"/>
+              <a:t>search results</a:t>
+            </a:r>
+            <a:endParaRPr lang="ru-RU" dirty="0"/>
+          </a:p>
+        </p:txBody>
+      </p:sp>
+      <p:cxnSp>
+        <p:nvCxnSpPr>
+          <p:cNvPr id="9" name="Прямая со стрелкой 8"/>
+          <p:cNvCxnSpPr>
+            <a:stCxn id="8" idx="3"/>
+            <a:endCxn id="10" idx="1"/>
+          </p:cNvCxnSpPr>
+          <p:nvPr/>
+        </p:nvCxnSpPr>
+        <p:spPr>
+          <a:xfrm>
+            <a:off x="4349933" y="1055389"/>
+            <a:ext cx="613951" cy="0"/>
+          </a:xfrm>
+          <a:prstGeom prst="straightConnector1">
+            <a:avLst/>
+          </a:prstGeom>
+          <a:ln>
+            <a:tailEnd type="triangle"/>
+          </a:ln>
+        </p:spPr>
+        <p:style>
+          <a:lnRef idx="1">
+            <a:schemeClr val="dk1"/>
+          </a:lnRef>
+          <a:fillRef idx="0">
+            <a:schemeClr val="dk1"/>
+          </a:fillRef>
+          <a:effectRef idx="0">
+            <a:schemeClr val="dk1"/>
+          </a:effectRef>
+          <a:fontRef idx="minor">
+            <a:schemeClr val="tx1"/>
+          </a:fontRef>
+        </p:style>
+      </p:cxnSp>
+      <p:sp>
+        <p:nvSpPr>
+          <p:cNvPr id="10" name="Прямоугольник 9"/>
+          <p:cNvSpPr/>
+          <p:nvPr/>
+        </p:nvSpPr>
+        <p:spPr>
+          <a:xfrm>
+            <a:off x="4963884" y="400594"/>
+            <a:ext cx="1528357" cy="1309590"/>
+          </a:xfrm>
+          <a:prstGeom prst="rect">
+            <a:avLst/>
+          </a:prstGeom>
+        </p:spPr>
+        <p:style>
+          <a:lnRef idx="2">
+            <a:schemeClr val="dk1"/>
+          </a:lnRef>
+          <a:fillRef idx="1">
+            <a:schemeClr val="lt1"/>
+          </a:fillRef>
+          <a:effectRef idx="0">
+            <a:schemeClr val="dk1"/>
+          </a:effectRef>
+          <a:fontRef idx="minor">
+            <a:schemeClr val="dk1"/>
+          </a:fontRef>
+        </p:style>
+        <p:txBody>
+          <a:bodyPr rtlCol="0" anchor="ctr"/>
+          <a:lstStyle/>
+          <a:p>
+            <a:pPr algn="ctr"/>
+            <a:r>
+              <a:rPr lang="en-US" dirty="0"/>
+              <a:t>Website with an order form</a:t>
+            </a:r>
+            <a:endParaRPr lang="ru-RU" dirty="0"/>
+          </a:p>
+        </p:txBody>
+      </p:sp>
+      <p:cxnSp>
+        <p:nvCxnSpPr>
+          <p:cNvPr id="11" name="Прямая со стрелкой 10"/>
+          <p:cNvCxnSpPr>
+            <a:stCxn id="10" idx="3"/>
+            <a:endCxn id="13" idx="1"/>
+          </p:cNvCxnSpPr>
+          <p:nvPr/>
+        </p:nvCxnSpPr>
+        <p:spPr>
+          <a:xfrm>
+            <a:off x="6492241" y="1055389"/>
+            <a:ext cx="613951" cy="0"/>
+          </a:xfrm>
+          <a:prstGeom prst="straightConnector1">
+            <a:avLst/>
+          </a:prstGeom>
+          <a:ln>
+            <a:tailEnd type="triangle"/>
+          </a:ln>
+        </p:spPr>
+        <p:style>
+          <a:lnRef idx="1">
+            <a:schemeClr val="dk1"/>
+          </a:lnRef>
+          <a:fillRef idx="0">
+            <a:schemeClr val="dk1"/>
+          </a:fillRef>
+          <a:effectRef idx="0">
+            <a:schemeClr val="dk1"/>
+          </a:effectRef>
+          <a:fontRef idx="minor">
+            <a:schemeClr val="tx1"/>
+          </a:fontRef>
+        </p:style>
+      </p:cxnSp>
+      <p:sp>
+        <p:nvSpPr>
+          <p:cNvPr id="13" name="Прямоугольник 12"/>
+          <p:cNvSpPr/>
+          <p:nvPr/>
+        </p:nvSpPr>
+        <p:spPr>
+          <a:xfrm>
+            <a:off x="7106192" y="400594"/>
+            <a:ext cx="4781007" cy="1309590"/>
+          </a:xfrm>
+          <a:prstGeom prst="rect">
+            <a:avLst/>
+          </a:prstGeom>
+        </p:spPr>
+        <p:style>
+          <a:lnRef idx="2">
+            <a:schemeClr val="dk1"/>
+          </a:lnRef>
+          <a:fillRef idx="1">
+            <a:schemeClr val="lt1"/>
+          </a:fillRef>
+          <a:effectRef idx="0">
+            <a:schemeClr val="dk1"/>
+          </a:effectRef>
+          <a:fontRef idx="minor">
+            <a:schemeClr val="dk1"/>
+          </a:fontRef>
+        </p:style>
+        <p:txBody>
+          <a:bodyPr rtlCol="0" anchor="ctr"/>
+          <a:lstStyle/>
+          <a:p>
+            <a:pPr algn="ctr"/>
+            <a:r>
+              <a:rPr lang="en-US" dirty="0"/>
+              <a:t>The data is analyzed by a mathematical model (calculates the optimal paths, looks for the store with the lowest price, gives it to </a:t>
+            </a:r>
+            <a:r>
+              <a:rPr lang="en-US" dirty="0" smtClean="0"/>
+              <a:t>the optimal </a:t>
+            </a:r>
+            <a:r>
+              <a:rPr lang="en-US" dirty="0"/>
+              <a:t>driver)</a:t>
+            </a:r>
+            <a:endParaRPr lang="ru-RU" dirty="0"/>
+          </a:p>
+        </p:txBody>
+      </p:sp>
+      <p:cxnSp>
+        <p:nvCxnSpPr>
+          <p:cNvPr id="14" name="Прямая со стрелкой 13"/>
+          <p:cNvCxnSpPr>
+            <a:stCxn id="13" idx="3"/>
+          </p:cNvCxnSpPr>
+          <p:nvPr/>
+        </p:nvCxnSpPr>
+        <p:spPr>
+          <a:xfrm>
+            <a:off x="11887199" y="1055389"/>
+            <a:ext cx="0" cy="1814988"/>
+          </a:xfrm>
+          <a:prstGeom prst="straightConnector1">
+            <a:avLst/>
+          </a:prstGeom>
+          <a:ln>
+            <a:tailEnd type="triangle"/>
+          </a:ln>
+        </p:spPr>
+        <p:style>
+          <a:lnRef idx="1">
+            <a:schemeClr val="dk1"/>
+          </a:lnRef>
+          <a:fillRef idx="0">
+            <a:schemeClr val="dk1"/>
+          </a:fillRef>
+          <a:effectRef idx="0">
+            <a:schemeClr val="dk1"/>
+          </a:effectRef>
+          <a:fontRef idx="minor">
+            <a:schemeClr val="tx1"/>
+          </a:fontRef>
+        </p:style>
+      </p:cxnSp>
+      <p:sp>
+        <p:nvSpPr>
+          <p:cNvPr id="22" name="Прямоугольник 21"/>
+          <p:cNvSpPr/>
+          <p:nvPr/>
+        </p:nvSpPr>
+        <p:spPr>
+          <a:xfrm>
+            <a:off x="8752114" y="2870377"/>
+            <a:ext cx="3135085" cy="1302831"/>
+          </a:xfrm>
+          <a:prstGeom prst="rect">
+            <a:avLst/>
+          </a:prstGeom>
+        </p:spPr>
+        <p:style>
+          <a:lnRef idx="2">
+            <a:schemeClr val="dk1"/>
+          </a:lnRef>
+          <a:fillRef idx="1">
+            <a:schemeClr val="lt1"/>
+          </a:fillRef>
+          <a:effectRef idx="0">
+            <a:schemeClr val="dk1"/>
+          </a:effectRef>
+          <a:fontRef idx="minor">
+            <a:schemeClr val="dk1"/>
+          </a:fontRef>
+        </p:style>
+        <p:txBody>
+          <a:bodyPr rtlCol="0" anchor="ctr"/>
+          <a:lstStyle/>
+          <a:p>
+            <a:pPr algn="ctr"/>
+            <a:r>
+              <a:rPr lang="en-US" dirty="0"/>
+              <a:t>The calculated data on the total cost and time is sent to the client for confirmation</a:t>
+            </a:r>
+            <a:endParaRPr lang="ru-RU" dirty="0"/>
+          </a:p>
+        </p:txBody>
+      </p:sp>
+      <p:cxnSp>
+        <p:nvCxnSpPr>
+          <p:cNvPr id="23" name="Прямая со стрелкой 22"/>
+          <p:cNvCxnSpPr>
+            <a:stCxn id="22" idx="1"/>
+            <a:endCxn id="40" idx="3"/>
+          </p:cNvCxnSpPr>
+          <p:nvPr/>
+        </p:nvCxnSpPr>
+        <p:spPr>
+          <a:xfrm flipH="1">
+            <a:off x="8159930" y="3521793"/>
+            <a:ext cx="592184" cy="0"/>
+          </a:xfrm>
+          <a:prstGeom prst="straightConnector1">
+            <a:avLst/>
+          </a:prstGeom>
+          <a:ln>
+            <a:tailEnd type="triangle"/>
+          </a:ln>
+        </p:spPr>
+        <p:style>
+          <a:lnRef idx="1">
+            <a:schemeClr val="dk1"/>
+          </a:lnRef>
+          <a:fillRef idx="0">
+            <a:schemeClr val="dk1"/>
+          </a:fillRef>
+          <a:effectRef idx="0">
+            <a:schemeClr val="dk1"/>
+          </a:effectRef>
+          <a:fontRef idx="minor">
+            <a:schemeClr val="tx1"/>
+          </a:fontRef>
+        </p:style>
+      </p:cxnSp>
+      <p:sp>
+        <p:nvSpPr>
+          <p:cNvPr id="40" name="Прямоугольник 39"/>
+          <p:cNvSpPr/>
+          <p:nvPr/>
+        </p:nvSpPr>
+        <p:spPr>
+          <a:xfrm>
+            <a:off x="6278879" y="2870377"/>
+            <a:ext cx="1881051" cy="1302831"/>
+          </a:xfrm>
+          <a:prstGeom prst="rect">
+            <a:avLst/>
+          </a:prstGeom>
+        </p:spPr>
+        <p:style>
+          <a:lnRef idx="2">
+            <a:schemeClr val="dk1"/>
+          </a:lnRef>
+          <a:fillRef idx="1">
+            <a:schemeClr val="lt1"/>
+          </a:fillRef>
+          <a:effectRef idx="0">
+            <a:schemeClr val="dk1"/>
+          </a:effectRef>
+          <a:fontRef idx="minor">
+            <a:schemeClr val="dk1"/>
+          </a:fontRef>
+        </p:style>
+        <p:txBody>
+          <a:bodyPr rtlCol="0" anchor="ctr"/>
+          <a:lstStyle/>
+          <a:p>
+            <a:pPr algn="ctr"/>
+            <a:r>
+              <a:rPr lang="en-US" dirty="0"/>
+              <a:t>Confirmation and payment</a:t>
+            </a:r>
+            <a:endParaRPr lang="ru-RU" dirty="0"/>
+          </a:p>
+        </p:txBody>
+      </p:sp>
+      <p:cxnSp>
+        <p:nvCxnSpPr>
+          <p:cNvPr id="41" name="Прямая со стрелкой 40"/>
+          <p:cNvCxnSpPr>
+            <a:stCxn id="40" idx="1"/>
+            <a:endCxn id="45" idx="3"/>
+          </p:cNvCxnSpPr>
+          <p:nvPr/>
+        </p:nvCxnSpPr>
+        <p:spPr>
+          <a:xfrm flipH="1">
+            <a:off x="5715001" y="3521793"/>
+            <a:ext cx="563878" cy="0"/>
+          </a:xfrm>
+          <a:prstGeom prst="straightConnector1">
+            <a:avLst/>
+          </a:prstGeom>
+          <a:ln>
+            <a:tailEnd type="triangle"/>
+          </a:ln>
+        </p:spPr>
+        <p:style>
+          <a:lnRef idx="1">
+            <a:schemeClr val="dk1"/>
+          </a:lnRef>
+          <a:fillRef idx="0">
+            <a:schemeClr val="dk1"/>
+          </a:fillRef>
+          <a:effectRef idx="0">
+            <a:schemeClr val="dk1"/>
+          </a:effectRef>
+          <a:fontRef idx="minor">
+            <a:schemeClr val="tx1"/>
+          </a:fontRef>
+        </p:style>
+      </p:cxnSp>
+      <p:sp>
+        <p:nvSpPr>
+          <p:cNvPr id="45" name="Прямоугольник 44"/>
+          <p:cNvSpPr/>
+          <p:nvPr/>
+        </p:nvSpPr>
+        <p:spPr>
+          <a:xfrm>
+            <a:off x="3328850" y="2870377"/>
+            <a:ext cx="2386151" cy="1302831"/>
+          </a:xfrm>
+          <a:prstGeom prst="rect">
+            <a:avLst/>
+          </a:prstGeom>
+        </p:spPr>
+        <p:style>
+          <a:lnRef idx="2">
+            <a:schemeClr val="dk1"/>
+          </a:lnRef>
+          <a:fillRef idx="1">
+            <a:schemeClr val="lt1"/>
+          </a:fillRef>
+          <a:effectRef idx="0">
+            <a:schemeClr val="dk1"/>
+          </a:effectRef>
+          <a:fontRef idx="minor">
+            <a:schemeClr val="dk1"/>
+          </a:fontRef>
+        </p:style>
+        <p:txBody>
+          <a:bodyPr rtlCol="0" anchor="ctr"/>
+          <a:lstStyle/>
+          <a:p>
+            <a:pPr algn="ctr"/>
+            <a:r>
+              <a:rPr lang="en-US" dirty="0"/>
+              <a:t>Order data is transferred to the contractor for purchase</a:t>
+            </a:r>
+            <a:endParaRPr lang="ru-RU" dirty="0"/>
+          </a:p>
+        </p:txBody>
+      </p:sp>
+      <p:cxnSp>
+        <p:nvCxnSpPr>
+          <p:cNvPr id="46" name="Прямая со стрелкой 45"/>
+          <p:cNvCxnSpPr>
+            <a:stCxn id="45" idx="1"/>
+            <a:endCxn id="72" idx="3"/>
+          </p:cNvCxnSpPr>
+          <p:nvPr/>
+        </p:nvCxnSpPr>
+        <p:spPr>
+          <a:xfrm flipH="1">
+            <a:off x="2764973" y="3521793"/>
+            <a:ext cx="563877" cy="0"/>
+          </a:xfrm>
+          <a:prstGeom prst="straightConnector1">
+            <a:avLst/>
+          </a:prstGeom>
+          <a:ln>
+            <a:tailEnd type="triangle"/>
+          </a:ln>
+        </p:spPr>
+        <p:style>
+          <a:lnRef idx="1">
+            <a:schemeClr val="dk1"/>
+          </a:lnRef>
+          <a:fillRef idx="0">
+            <a:schemeClr val="dk1"/>
+          </a:fillRef>
+          <a:effectRef idx="0">
+            <a:schemeClr val="dk1"/>
+          </a:effectRef>
+          <a:fontRef idx="minor">
+            <a:schemeClr val="tx1"/>
+          </a:fontRef>
+        </p:style>
+      </p:cxnSp>
+      <p:sp>
+        <p:nvSpPr>
+          <p:cNvPr id="51" name="Прямоугольник 50"/>
+          <p:cNvSpPr/>
+          <p:nvPr/>
+        </p:nvSpPr>
+        <p:spPr>
+          <a:xfrm>
+            <a:off x="574766" y="5328745"/>
+            <a:ext cx="2246811" cy="1302831"/>
+          </a:xfrm>
+          <a:prstGeom prst="rect">
+            <a:avLst/>
+          </a:prstGeom>
+        </p:spPr>
+        <p:style>
+          <a:lnRef idx="2">
+            <a:schemeClr val="dk1"/>
+          </a:lnRef>
+          <a:fillRef idx="1">
+            <a:schemeClr val="lt1"/>
+          </a:fillRef>
+          <a:effectRef idx="0">
+            <a:schemeClr val="dk1"/>
+          </a:effectRef>
+          <a:fontRef idx="minor">
+            <a:schemeClr val="dk1"/>
+          </a:fontRef>
+        </p:style>
+        <p:txBody>
+          <a:bodyPr rtlCol="0" anchor="ctr"/>
+          <a:lstStyle/>
+          <a:p>
+            <a:pPr algn="ctr"/>
+            <a:r>
+              <a:rPr lang="en-US" dirty="0"/>
+              <a:t>The contractor passes the border, if necessary, pays a fee</a:t>
+            </a:r>
+            <a:endParaRPr lang="ru-RU" dirty="0"/>
+          </a:p>
+        </p:txBody>
+      </p:sp>
+      <p:cxnSp>
+        <p:nvCxnSpPr>
+          <p:cNvPr id="52" name="Прямая со стрелкой 51"/>
+          <p:cNvCxnSpPr>
+            <a:stCxn id="51" idx="3"/>
+            <a:endCxn id="62" idx="1"/>
+          </p:cNvCxnSpPr>
+          <p:nvPr/>
+        </p:nvCxnSpPr>
+        <p:spPr>
+          <a:xfrm flipV="1">
+            <a:off x="2821577" y="5980160"/>
+            <a:ext cx="688429" cy="1"/>
+          </a:xfrm>
+          <a:prstGeom prst="straightConnector1">
+            <a:avLst/>
+          </a:prstGeom>
+          <a:ln>
+            <a:tailEnd type="triangle"/>
+          </a:ln>
+        </p:spPr>
+        <p:style>
+          <a:lnRef idx="1">
+            <a:schemeClr val="dk1"/>
+          </a:lnRef>
+          <a:fillRef idx="0">
+            <a:schemeClr val="dk1"/>
+          </a:fillRef>
+          <a:effectRef idx="0">
+            <a:schemeClr val="dk1"/>
+          </a:effectRef>
+          <a:fontRef idx="minor">
+            <a:schemeClr val="tx1"/>
+          </a:fontRef>
+        </p:style>
+      </p:cxnSp>
+      <p:sp>
+        <p:nvSpPr>
+          <p:cNvPr id="62" name="Прямоугольник 61"/>
+          <p:cNvSpPr/>
+          <p:nvPr/>
+        </p:nvSpPr>
+        <p:spPr>
+          <a:xfrm>
+            <a:off x="3510006" y="5328744"/>
+            <a:ext cx="1592763" cy="1302831"/>
+          </a:xfrm>
+          <a:prstGeom prst="rect">
+            <a:avLst/>
+          </a:prstGeom>
+        </p:spPr>
+        <p:style>
+          <a:lnRef idx="2">
+            <a:schemeClr val="dk1"/>
+          </a:lnRef>
+          <a:fillRef idx="1">
+            <a:schemeClr val="lt1"/>
+          </a:fillRef>
+          <a:effectRef idx="0">
+            <a:schemeClr val="dk1"/>
+          </a:effectRef>
+          <a:fontRef idx="minor">
+            <a:schemeClr val="dk1"/>
+          </a:fontRef>
+        </p:style>
+        <p:txBody>
+          <a:bodyPr rtlCol="0" anchor="ctr"/>
+          <a:lstStyle/>
+          <a:p>
+            <a:pPr algn="ctr"/>
+            <a:r>
+              <a:rPr lang="en-US" dirty="0"/>
+              <a:t>The contractor carries the order to the destination</a:t>
+            </a:r>
+            <a:endParaRPr lang="ru-RU" dirty="0"/>
+          </a:p>
+        </p:txBody>
+      </p:sp>
+      <p:cxnSp>
+        <p:nvCxnSpPr>
+          <p:cNvPr id="63" name="Прямая со стрелкой 62"/>
+          <p:cNvCxnSpPr>
+            <a:stCxn id="62" idx="3"/>
+            <a:endCxn id="64" idx="1"/>
+          </p:cNvCxnSpPr>
+          <p:nvPr/>
+        </p:nvCxnSpPr>
+        <p:spPr>
+          <a:xfrm>
+            <a:off x="5102769" y="5980160"/>
+            <a:ext cx="688430" cy="2"/>
+          </a:xfrm>
+          <a:prstGeom prst="straightConnector1">
+            <a:avLst/>
+          </a:prstGeom>
+          <a:ln>
+            <a:tailEnd type="triangle"/>
+          </a:ln>
+        </p:spPr>
+        <p:style>
+          <a:lnRef idx="1">
+            <a:schemeClr val="dk1"/>
+          </a:lnRef>
+          <a:fillRef idx="0">
+            <a:schemeClr val="dk1"/>
+          </a:fillRef>
+          <a:effectRef idx="0">
+            <a:schemeClr val="dk1"/>
+          </a:effectRef>
+          <a:fontRef idx="minor">
+            <a:schemeClr val="tx1"/>
+          </a:fontRef>
+        </p:style>
+      </p:cxnSp>
+      <p:sp>
+        <p:nvSpPr>
+          <p:cNvPr id="64" name="Прямоугольник 63"/>
+          <p:cNvSpPr/>
+          <p:nvPr/>
+        </p:nvSpPr>
+        <p:spPr>
+          <a:xfrm>
+            <a:off x="5791199" y="5328746"/>
+            <a:ext cx="1793966" cy="1302832"/>
+          </a:xfrm>
+          <a:prstGeom prst="rect">
+            <a:avLst/>
+          </a:prstGeom>
+        </p:spPr>
+        <p:style>
+          <a:lnRef idx="2">
+            <a:schemeClr val="dk1"/>
+          </a:lnRef>
+          <a:fillRef idx="1">
+            <a:schemeClr val="lt1"/>
+          </a:fillRef>
+          <a:effectRef idx="0">
+            <a:schemeClr val="dk1"/>
+          </a:effectRef>
+          <a:fontRef idx="minor">
+            <a:schemeClr val="dk1"/>
+          </a:fontRef>
+        </p:style>
+        <p:txBody>
+          <a:bodyPr rtlCol="0" anchor="ctr"/>
+          <a:lstStyle/>
+          <a:p>
+            <a:pPr algn="ctr"/>
+            <a:r>
+              <a:rPr lang="en-US" dirty="0"/>
+              <a:t>The contractor sends the order to the client</a:t>
+            </a:r>
+            <a:endParaRPr lang="ru-RU" dirty="0"/>
+          </a:p>
+        </p:txBody>
+      </p:sp>
+      <p:cxnSp>
+        <p:nvCxnSpPr>
+          <p:cNvPr id="65" name="Прямая со стрелкой 64"/>
+          <p:cNvCxnSpPr/>
+          <p:nvPr/>
+        </p:nvCxnSpPr>
+        <p:spPr>
+          <a:xfrm>
+            <a:off x="7585165" y="6013270"/>
+            <a:ext cx="879568" cy="1"/>
+          </a:xfrm>
+          <a:prstGeom prst="straightConnector1">
+            <a:avLst/>
+          </a:prstGeom>
+          <a:ln>
+            <a:tailEnd type="triangle"/>
+          </a:ln>
+        </p:spPr>
+        <p:style>
+          <a:lnRef idx="1">
+            <a:schemeClr val="dk1"/>
+          </a:lnRef>
+          <a:fillRef idx="0">
+            <a:schemeClr val="dk1"/>
+          </a:fillRef>
+          <a:effectRef idx="0">
+            <a:schemeClr val="dk1"/>
+          </a:effectRef>
+          <a:fontRef idx="minor">
+            <a:schemeClr val="tx1"/>
+          </a:fontRef>
+        </p:style>
+      </p:cxnSp>
+      <p:sp>
+        <p:nvSpPr>
+          <p:cNvPr id="72" name="Прямоугольник 71"/>
+          <p:cNvSpPr/>
+          <p:nvPr/>
+        </p:nvSpPr>
+        <p:spPr>
+          <a:xfrm>
+            <a:off x="574766" y="2870377"/>
+            <a:ext cx="2190207" cy="1302831"/>
+          </a:xfrm>
+          <a:prstGeom prst="rect">
+            <a:avLst/>
+          </a:prstGeom>
+        </p:spPr>
+        <p:style>
+          <a:lnRef idx="2">
+            <a:schemeClr val="dk1"/>
+          </a:lnRef>
+          <a:fillRef idx="1">
+            <a:schemeClr val="lt1"/>
+          </a:fillRef>
+          <a:effectRef idx="0">
+            <a:schemeClr val="dk1"/>
+          </a:effectRef>
+          <a:fontRef idx="minor">
+            <a:schemeClr val="dk1"/>
+          </a:fontRef>
+        </p:style>
+        <p:txBody>
+          <a:bodyPr rtlCol="0" anchor="ctr"/>
+          <a:lstStyle/>
+          <a:p>
+            <a:pPr algn="ctr"/>
+            <a:r>
+              <a:rPr lang="en-US" dirty="0"/>
+              <a:t>The contractor returns VAT from the last trip and buys the goods</a:t>
+            </a:r>
+            <a:endParaRPr lang="ru-RU" dirty="0"/>
+          </a:p>
+        </p:txBody>
+      </p:sp>
+      <p:cxnSp>
+        <p:nvCxnSpPr>
+          <p:cNvPr id="73" name="Прямая со стрелкой 72"/>
+          <p:cNvCxnSpPr>
+            <a:stCxn id="72" idx="1"/>
+          </p:cNvCxnSpPr>
+          <p:nvPr/>
+        </p:nvCxnSpPr>
+        <p:spPr>
+          <a:xfrm>
+            <a:off x="574766" y="3521793"/>
+            <a:ext cx="0" cy="1806951"/>
+          </a:xfrm>
+          <a:prstGeom prst="straightConnector1">
+            <a:avLst/>
+          </a:prstGeom>
+          <a:ln>
+            <a:tailEnd type="triangle"/>
+          </a:ln>
+        </p:spPr>
+        <p:style>
+          <a:lnRef idx="1">
+            <a:schemeClr val="dk1"/>
+          </a:lnRef>
+          <a:fillRef idx="0">
+            <a:schemeClr val="dk1"/>
+          </a:fillRef>
+          <a:effectRef idx="0">
+            <a:schemeClr val="dk1"/>
+          </a:effectRef>
+          <a:fontRef idx="minor">
+            <a:schemeClr val="tx1"/>
+          </a:fontRef>
+        </p:style>
+      </p:cxnSp>
+      <p:sp>
+        <p:nvSpPr>
+          <p:cNvPr id="76" name="Овал 75"/>
+          <p:cNvSpPr/>
+          <p:nvPr/>
+        </p:nvSpPr>
+        <p:spPr>
+          <a:xfrm>
+            <a:off x="8464733" y="5505996"/>
+            <a:ext cx="2168434" cy="1014548"/>
+          </a:xfrm>
+          <a:prstGeom prst="ellipse">
+            <a:avLst/>
+          </a:prstGeom>
+        </p:spPr>
+        <p:style>
+          <a:lnRef idx="2">
+            <a:schemeClr val="accent1">
+              <a:shade val="50000"/>
+            </a:schemeClr>
+          </a:lnRef>
+          <a:fillRef idx="1">
+            <a:schemeClr val="accent1"/>
+          </a:fillRef>
+          <a:effectRef idx="0">
+            <a:schemeClr val="accent1"/>
+          </a:effectRef>
+          <a:fontRef idx="minor">
+            <a:schemeClr val="lt1"/>
+          </a:fontRef>
+        </p:style>
+        <p:txBody>
+          <a:bodyPr rtlCol="0" anchor="ctr"/>
+          <a:lstStyle/>
+          <a:p>
+            <a:pPr algn="ctr"/>
+            <a:r>
+              <a:rPr lang="en-US" dirty="0"/>
+              <a:t>The process repeats</a:t>
+            </a:r>
+            <a:endParaRPr lang="ru-RU" dirty="0"/>
+          </a:p>
+        </p:txBody>
+      </p:sp>
+    </p:spTree>
+    <p:extLst>
+      <p:ext uri="{BB962C8B-B14F-4D97-AF65-F5344CB8AC3E}">
+        <p14:creationId xmlns:p14="http://schemas.microsoft.com/office/powerpoint/2010/main" val="3989688625"/>
+      </p:ext>
+    </p:extLst>
+  </p:cSld>
+  <p:clrMapOvr>
+    <a:masterClrMapping/>
+  </p:clrMapOvr>
+  <p:timing>
+    <p:tnLst>
+      <p:par>
+        <p:cTn id="1" dur="indefinite" restart="never" nodeType="tmRoot"/>
+      </p:par>
+    </p:tnLst>
+  </p:timing>
 </p:sld>
 </file>
 

</xml_diff>